<commit_message>
Update Embedded Devices Malware Detection, Prevention & Centralization.pptx
</commit_message>
<xml_diff>
--- a/Embedded Devices Malware Detection, Prevention & Centralization.pptx
+++ b/Embedded Devices Malware Detection, Prevention & Centralization.pptx
@@ -387,7 +387,7 @@
           <a:p>
             <a:fld id="{2D50CD79-FC16-4410-AB61-17F26E6D3BC8}" type="datetimeFigureOut">
               <a:rPr lang="en-US"/>
-              <a:t>5/14/2021</a:t>
+              <a:t>5/15/2021</a:t>
             </a:fld>
             <a:endParaRPr/>
           </a:p>
@@ -1029,7 +1029,7 @@
             <a:fld id="{402B9795-92DC-40DC-A1CA-9A4B349D7824}" type="datetimeFigureOut">
               <a:rPr lang="en-US" smtClean="0"/>
               <a:pPr/>
-              <a:t>5/14/2021</a:t>
+              <a:t>5/15/2021</a:t>
             </a:fld>
             <a:endParaRPr lang="en-US" dirty="0"/>
           </a:p>
@@ -1323,7 +1323,7 @@
           <a:p>
             <a:fld id="{402B9795-92DC-40DC-A1CA-9A4B349D7824}" type="datetimeFigureOut">
               <a:rPr lang="en-US"/>
-              <a:t>5/14/2021</a:t>
+              <a:t>5/15/2021</a:t>
             </a:fld>
             <a:endParaRPr/>
           </a:p>
@@ -1505,7 +1505,7 @@
           <a:p>
             <a:fld id="{402B9795-92DC-40DC-A1CA-9A4B349D7824}" type="datetimeFigureOut">
               <a:rPr lang="en-US"/>
-              <a:t>5/14/2021</a:t>
+              <a:t>5/15/2021</a:t>
             </a:fld>
             <a:endParaRPr/>
           </a:p>
@@ -1697,7 +1697,7 @@
           <a:p>
             <a:fld id="{402B9795-92DC-40DC-A1CA-9A4B349D7824}" type="datetimeFigureOut">
               <a:rPr lang="en-US"/>
-              <a:t>5/14/2021</a:t>
+              <a:t>5/15/2021</a:t>
             </a:fld>
             <a:endParaRPr/>
           </a:p>
@@ -1966,7 +1966,7 @@
           <a:p>
             <a:fld id="{402B9795-92DC-40DC-A1CA-9A4B349D7824}" type="datetimeFigureOut">
               <a:rPr lang="en-US"/>
-              <a:t>5/14/2021</a:t>
+              <a:t>5/15/2021</a:t>
             </a:fld>
             <a:endParaRPr/>
           </a:p>
@@ -2995,7 +2995,7 @@
           <a:p>
             <a:fld id="{402B9795-92DC-40DC-A1CA-9A4B349D7824}" type="datetimeFigureOut">
               <a:rPr lang="en-US"/>
-              <a:t>5/14/2021</a:t>
+              <a:t>5/15/2021</a:t>
             </a:fld>
             <a:endParaRPr/>
           </a:p>
@@ -3268,7 +3268,7 @@
           <a:p>
             <a:fld id="{402B9795-92DC-40DC-A1CA-9A4B349D7824}" type="datetimeFigureOut">
               <a:rPr lang="en-US"/>
-              <a:t>5/14/2021</a:t>
+              <a:t>5/15/2021</a:t>
             </a:fld>
             <a:endParaRPr/>
           </a:p>
@@ -3648,7 +3648,7 @@
           <a:p>
             <a:fld id="{402B9795-92DC-40DC-A1CA-9A4B349D7824}" type="datetimeFigureOut">
               <a:rPr lang="en-US"/>
-              <a:t>5/14/2021</a:t>
+              <a:t>5/15/2021</a:t>
             </a:fld>
             <a:endParaRPr/>
           </a:p>
@@ -3778,7 +3778,7 @@
           <a:p>
             <a:fld id="{402B9795-92DC-40DC-A1CA-9A4B349D7824}" type="datetimeFigureOut">
               <a:rPr lang="en-US"/>
-              <a:t>5/14/2021</a:t>
+              <a:t>5/15/2021</a:t>
             </a:fld>
             <a:endParaRPr/>
           </a:p>
@@ -3885,7 +3885,7 @@
           <a:p>
             <a:fld id="{402B9795-92DC-40DC-A1CA-9A4B349D7824}" type="datetimeFigureOut">
               <a:rPr lang="en-US"/>
-              <a:t>5/14/2021</a:t>
+              <a:t>5/15/2021</a:t>
             </a:fld>
             <a:endParaRPr/>
           </a:p>
@@ -4176,7 +4176,7 @@
           <a:p>
             <a:fld id="{402B9795-92DC-40DC-A1CA-9A4B349D7824}" type="datetimeFigureOut">
               <a:rPr lang="en-US"/>
-              <a:t>5/14/2021</a:t>
+              <a:t>5/15/2021</a:t>
             </a:fld>
             <a:endParaRPr/>
           </a:p>
@@ -4402,7 +4402,7 @@
             <a:fld id="{402B9795-92DC-40DC-A1CA-9A4B349D7824}" type="datetimeFigureOut">
               <a:rPr lang="en-US" smtClean="0"/>
               <a:pPr/>
-              <a:t>5/14/2021</a:t>
+              <a:t>5/15/2021</a:t>
             </a:fld>
             <a:endParaRPr lang="en-US"/>
           </a:p>
@@ -4988,8 +4988,8 @@
         </p:nvSpPr>
         <p:spPr>
           <a:xfrm>
-            <a:off x="3939540" y="3860710"/>
-            <a:ext cx="1735836" cy="407688"/>
+            <a:off x="3389376" y="3860710"/>
+            <a:ext cx="3444240" cy="407688"/>
           </a:xfrm>
         </p:spPr>
         <p:txBody>
@@ -4999,8 +4999,14 @@
           <a:lstStyle/>
           <a:p>
             <a:r>
-              <a:rPr lang="en-US" sz="1600" dirty="0"/>
+              <a:rPr lang="en-US" sz="1000" dirty="0"/>
               <a:t>Andrei Grigoras</a:t>
+            </a:r>
+          </a:p>
+          <a:p>
+            <a:r>
+              <a:rPr lang="ro-RO" sz="1000" dirty="0"/>
+              <a:t>Coordonator științific: Prof. dr. ing. Cornel Popescu</a:t>
             </a:r>
           </a:p>
         </p:txBody>
@@ -5580,13 +5586,13 @@
   <p:clrMapOvr>
     <a:masterClrMapping/>
   </p:clrMapOvr>
-  <mc:AlternateContent xmlns:mc="http://schemas.openxmlformats.org/markup-compatibility/2006">
-    <mc:Choice xmlns:p14="http://schemas.microsoft.com/office/powerpoint/2010/main" Requires="p14">
+  <mc:AlternateContent xmlns:mc="http://schemas.openxmlformats.org/markup-compatibility/2006" xmlns:p14="http://schemas.microsoft.com/office/powerpoint/2010/main">
+    <mc:Choice Requires="p14">
       <p:transition spd="med" p14:dur="700">
         <p:fade/>
       </p:transition>
     </mc:Choice>
-    <mc:Fallback>
+    <mc:Fallback xmlns="">
       <p:transition spd="med">
         <p:fade/>
       </p:transition>
@@ -5886,13 +5892,13 @@
   <p:clrMapOvr>
     <a:masterClrMapping/>
   </p:clrMapOvr>
-  <mc:AlternateContent xmlns:mc="http://schemas.openxmlformats.org/markup-compatibility/2006">
-    <mc:Choice xmlns:p14="http://schemas.microsoft.com/office/powerpoint/2010/main" Requires="p14">
+  <mc:AlternateContent xmlns:mc="http://schemas.openxmlformats.org/markup-compatibility/2006" xmlns:p14="http://schemas.microsoft.com/office/powerpoint/2010/main">
+    <mc:Choice Requires="p14">
       <p:transition spd="med" p14:dur="700">
         <p:fade/>
       </p:transition>
     </mc:Choice>
-    <mc:Fallback>
+    <mc:Fallback xmlns="">
       <p:transition spd="med">
         <p:fade/>
       </p:transition>
@@ -6187,13 +6193,13 @@
   <p:clrMapOvr>
     <a:masterClrMapping/>
   </p:clrMapOvr>
-  <mc:AlternateContent xmlns:mc="http://schemas.openxmlformats.org/markup-compatibility/2006">
-    <mc:Choice xmlns:p14="http://schemas.microsoft.com/office/powerpoint/2010/main" Requires="p14">
+  <mc:AlternateContent xmlns:mc="http://schemas.openxmlformats.org/markup-compatibility/2006" xmlns:p14="http://schemas.microsoft.com/office/powerpoint/2010/main">
+    <mc:Choice Requires="p14">
       <p:transition spd="med" p14:dur="700">
         <p:fade/>
       </p:transition>
     </mc:Choice>
-    <mc:Fallback>
+    <mc:Fallback xmlns="">
       <p:transition spd="med">
         <p:fade/>
       </p:transition>
@@ -6444,13 +6450,13 @@
   <p:clrMapOvr>
     <a:masterClrMapping/>
   </p:clrMapOvr>
-  <mc:AlternateContent xmlns:mc="http://schemas.openxmlformats.org/markup-compatibility/2006">
-    <mc:Choice xmlns:p14="http://schemas.microsoft.com/office/powerpoint/2010/main" Requires="p14">
+  <mc:AlternateContent xmlns:mc="http://schemas.openxmlformats.org/markup-compatibility/2006" xmlns:p14="http://schemas.microsoft.com/office/powerpoint/2010/main">
+    <mc:Choice Requires="p14">
       <p:transition spd="med" p14:dur="700">
         <p:fade/>
       </p:transition>
     </mc:Choice>
-    <mc:Fallback>
+    <mc:Fallback xmlns="">
       <p:transition spd="med">
         <p:fade/>
       </p:transition>
@@ -6698,13 +6704,13 @@
   <p:clrMapOvr>
     <a:masterClrMapping/>
   </p:clrMapOvr>
-  <mc:AlternateContent xmlns:mc="http://schemas.openxmlformats.org/markup-compatibility/2006">
-    <mc:Choice xmlns:p14="http://schemas.microsoft.com/office/powerpoint/2010/main" Requires="p14">
+  <mc:AlternateContent xmlns:mc="http://schemas.openxmlformats.org/markup-compatibility/2006" xmlns:p14="http://schemas.microsoft.com/office/powerpoint/2010/main">
+    <mc:Choice Requires="p14">
       <p:transition spd="med" p14:dur="700">
         <p:fade/>
       </p:transition>
     </mc:Choice>
-    <mc:Fallback>
+    <mc:Fallback xmlns="">
       <p:transition spd="med">
         <p:fade/>
       </p:transition>
@@ -7534,6 +7540,141 @@
 </file>
 
 <file path=customXml/item1.xml><?xml version="1.0" encoding="utf-8"?>
+<p:properties xmlns:p="http://schemas.microsoft.com/office/2006/metadata/properties" xmlns:xsi="http://www.w3.org/2001/XMLSchema-instance" xmlns:pc="http://schemas.microsoft.com/office/infopath/2007/PartnerControls">
+  <documentManagement>
+    <APDescription xmlns="4873beb7-5857-4685-be1f-d57550cc96cc" xsi:nil="true"/>
+    <AssetExpire xmlns="4873beb7-5857-4685-be1f-d57550cc96cc">2029-01-01T08:00:00+00:00</AssetExpire>
+    <CampaignTagsTaxHTField0 xmlns="4873beb7-5857-4685-be1f-d57550cc96cc">
+      <Terms xmlns="http://schemas.microsoft.com/office/infopath/2007/PartnerControls"/>
+    </CampaignTagsTaxHTField0>
+    <IntlLangReviewDate xmlns="4873beb7-5857-4685-be1f-d57550cc96cc" xsi:nil="true"/>
+    <TPFriendlyName xmlns="4873beb7-5857-4685-be1f-d57550cc96cc" xsi:nil="true"/>
+    <IntlLangReview xmlns="4873beb7-5857-4685-be1f-d57550cc96cc">false</IntlLangReview>
+    <LocLastLocAttemptVersionLookup xmlns="4873beb7-5857-4685-be1f-d57550cc96cc">855024</LocLastLocAttemptVersionLookup>
+    <PolicheckWords xmlns="4873beb7-5857-4685-be1f-d57550cc96cc" xsi:nil="true"/>
+    <SubmitterId xmlns="4873beb7-5857-4685-be1f-d57550cc96cc" xsi:nil="true"/>
+    <AcquiredFrom xmlns="4873beb7-5857-4685-be1f-d57550cc96cc">Internal MS</AcquiredFrom>
+    <EditorialStatus xmlns="4873beb7-5857-4685-be1f-d57550cc96cc">Complete</EditorialStatus>
+    <Markets xmlns="4873beb7-5857-4685-be1f-d57550cc96cc"/>
+    <OriginAsset xmlns="4873beb7-5857-4685-be1f-d57550cc96cc" xsi:nil="true"/>
+    <AssetStart xmlns="4873beb7-5857-4685-be1f-d57550cc96cc">2012-08-31T08:50:00+00:00</AssetStart>
+    <FriendlyTitle xmlns="4873beb7-5857-4685-be1f-d57550cc96cc" xsi:nil="true"/>
+    <MarketSpecific xmlns="4873beb7-5857-4685-be1f-d57550cc96cc">false</MarketSpecific>
+    <TPNamespace xmlns="4873beb7-5857-4685-be1f-d57550cc96cc" xsi:nil="true"/>
+    <PublishStatusLookup xmlns="4873beb7-5857-4685-be1f-d57550cc96cc">
+      <Value>1616423</Value>
+    </PublishStatusLookup>
+    <APAuthor xmlns="4873beb7-5857-4685-be1f-d57550cc96cc">
+      <UserInfo>
+        <DisplayName>REDMOND\kristaa</DisplayName>
+        <AccountId>136</AccountId>
+        <AccountType/>
+      </UserInfo>
+    </APAuthor>
+    <TPCommandLine xmlns="4873beb7-5857-4685-be1f-d57550cc96cc" xsi:nil="true"/>
+    <IntlLangReviewer xmlns="4873beb7-5857-4685-be1f-d57550cc96cc" xsi:nil="true"/>
+    <OpenTemplate xmlns="4873beb7-5857-4685-be1f-d57550cc96cc">true</OpenTemplate>
+    <CSXSubmissionDate xmlns="4873beb7-5857-4685-be1f-d57550cc96cc" xsi:nil="true"/>
+    <TaxCatchAll xmlns="4873beb7-5857-4685-be1f-d57550cc96cc"/>
+    <Manager xmlns="4873beb7-5857-4685-be1f-d57550cc96cc" xsi:nil="true"/>
+    <NumericId xmlns="4873beb7-5857-4685-be1f-d57550cc96cc" xsi:nil="true"/>
+    <ParentAssetId xmlns="4873beb7-5857-4685-be1f-d57550cc96cc" xsi:nil="true"/>
+    <OriginalSourceMarket xmlns="4873beb7-5857-4685-be1f-d57550cc96cc" xsi:nil="true"/>
+    <ApprovalStatus xmlns="4873beb7-5857-4685-be1f-d57550cc96cc">InProgress</ApprovalStatus>
+    <TPComponent xmlns="4873beb7-5857-4685-be1f-d57550cc96cc" xsi:nil="true"/>
+    <EditorialTags xmlns="4873beb7-5857-4685-be1f-d57550cc96cc" xsi:nil="true"/>
+    <TPExecutable xmlns="4873beb7-5857-4685-be1f-d57550cc96cc" xsi:nil="true"/>
+    <TPLaunchHelpLink xmlns="4873beb7-5857-4685-be1f-d57550cc96cc" xsi:nil="true"/>
+    <LocComments xmlns="4873beb7-5857-4685-be1f-d57550cc96cc" xsi:nil="true"/>
+    <LocRecommendedHandoff xmlns="4873beb7-5857-4685-be1f-d57550cc96cc" xsi:nil="true"/>
+    <SourceTitle xmlns="4873beb7-5857-4685-be1f-d57550cc96cc" xsi:nil="true"/>
+    <CSXUpdate xmlns="4873beb7-5857-4685-be1f-d57550cc96cc">false</CSXUpdate>
+    <IntlLocPriority xmlns="4873beb7-5857-4685-be1f-d57550cc96cc" xsi:nil="true"/>
+    <UAProjectedTotalWords xmlns="4873beb7-5857-4685-be1f-d57550cc96cc" xsi:nil="true"/>
+    <AssetType xmlns="4873beb7-5857-4685-be1f-d57550cc96cc">TP</AssetType>
+    <MachineTranslated xmlns="4873beb7-5857-4685-be1f-d57550cc96cc">false</MachineTranslated>
+    <OutputCachingOn xmlns="4873beb7-5857-4685-be1f-d57550cc96cc">false</OutputCachingOn>
+    <TemplateStatus xmlns="4873beb7-5857-4685-be1f-d57550cc96cc">Complete</TemplateStatus>
+    <IsSearchable xmlns="4873beb7-5857-4685-be1f-d57550cc96cc">true</IsSearchable>
+    <ContentItem xmlns="4873beb7-5857-4685-be1f-d57550cc96cc" xsi:nil="true"/>
+    <HandoffToMSDN xmlns="4873beb7-5857-4685-be1f-d57550cc96cc" xsi:nil="true"/>
+    <ShowIn xmlns="4873beb7-5857-4685-be1f-d57550cc96cc">Show everywhere</ShowIn>
+    <ThumbnailAssetId xmlns="4873beb7-5857-4685-be1f-d57550cc96cc" xsi:nil="true"/>
+    <UALocComments xmlns="4873beb7-5857-4685-be1f-d57550cc96cc" xsi:nil="true"/>
+    <UALocRecommendation xmlns="4873beb7-5857-4685-be1f-d57550cc96cc">Localize</UALocRecommendation>
+    <LastModifiedDateTime xmlns="4873beb7-5857-4685-be1f-d57550cc96cc" xsi:nil="true"/>
+    <LegacyData xmlns="4873beb7-5857-4685-be1f-d57550cc96cc" xsi:nil="true"/>
+    <LocManualTestRequired xmlns="4873beb7-5857-4685-be1f-d57550cc96cc">false</LocManualTestRequired>
+    <LocMarketGroupTiers2 xmlns="4873beb7-5857-4685-be1f-d57550cc96cc" xsi:nil="true"/>
+    <ClipArtFilename xmlns="4873beb7-5857-4685-be1f-d57550cc96cc" xsi:nil="true"/>
+    <TPApplication xmlns="4873beb7-5857-4685-be1f-d57550cc96cc" xsi:nil="true"/>
+    <CSXHash xmlns="4873beb7-5857-4685-be1f-d57550cc96cc" xsi:nil="true"/>
+    <DirectSourceMarket xmlns="4873beb7-5857-4685-be1f-d57550cc96cc" xsi:nil="true"/>
+    <PrimaryImageGen xmlns="4873beb7-5857-4685-be1f-d57550cc96cc">true</PrimaryImageGen>
+    <PlannedPubDate xmlns="4873beb7-5857-4685-be1f-d57550cc96cc" xsi:nil="true"/>
+    <CSXSubmissionMarket xmlns="4873beb7-5857-4685-be1f-d57550cc96cc" xsi:nil="true"/>
+    <Downloads xmlns="4873beb7-5857-4685-be1f-d57550cc96cc">0</Downloads>
+    <ArtSampleDocs xmlns="4873beb7-5857-4685-be1f-d57550cc96cc" xsi:nil="true"/>
+    <TrustLevel xmlns="4873beb7-5857-4685-be1f-d57550cc96cc">1 Microsoft Managed Content</TrustLevel>
+    <BlockPublish xmlns="4873beb7-5857-4685-be1f-d57550cc96cc">false</BlockPublish>
+    <TPLaunchHelpLinkType xmlns="4873beb7-5857-4685-be1f-d57550cc96cc">Template</TPLaunchHelpLinkType>
+    <LocalizationTagsTaxHTField0 xmlns="4873beb7-5857-4685-be1f-d57550cc96cc">
+      <Terms xmlns="http://schemas.microsoft.com/office/infopath/2007/PartnerControls"/>
+    </LocalizationTagsTaxHTField0>
+    <BusinessGroup xmlns="4873beb7-5857-4685-be1f-d57550cc96cc" xsi:nil="true"/>
+    <Providers xmlns="4873beb7-5857-4685-be1f-d57550cc96cc" xsi:nil="true"/>
+    <TemplateTemplateType xmlns="4873beb7-5857-4685-be1f-d57550cc96cc">PowerPoint Presentation Template</TemplateTemplateType>
+    <TimesCloned xmlns="4873beb7-5857-4685-be1f-d57550cc96cc" xsi:nil="true"/>
+    <TPAppVersion xmlns="4873beb7-5857-4685-be1f-d57550cc96cc" xsi:nil="true"/>
+    <VoteCount xmlns="4873beb7-5857-4685-be1f-d57550cc96cc" xsi:nil="true"/>
+    <AverageRating xmlns="4873beb7-5857-4685-be1f-d57550cc96cc" xsi:nil="true"/>
+    <FeatureTagsTaxHTField0 xmlns="4873beb7-5857-4685-be1f-d57550cc96cc">
+      <Terms xmlns="http://schemas.microsoft.com/office/infopath/2007/PartnerControls"/>
+    </FeatureTagsTaxHTField0>
+    <Provider xmlns="4873beb7-5857-4685-be1f-d57550cc96cc" xsi:nil="true"/>
+    <UACurrentWords xmlns="4873beb7-5857-4685-be1f-d57550cc96cc" xsi:nil="true"/>
+    <AssetId xmlns="4873beb7-5857-4685-be1f-d57550cc96cc">TP103431361</AssetId>
+    <TPClientViewer xmlns="4873beb7-5857-4685-be1f-d57550cc96cc" xsi:nil="true"/>
+    <DSATActionTaken xmlns="4873beb7-5857-4685-be1f-d57550cc96cc" xsi:nil="true"/>
+    <APEditor xmlns="4873beb7-5857-4685-be1f-d57550cc96cc">
+      <UserInfo>
+        <DisplayName/>
+        <AccountId xsi:nil="true"/>
+        <AccountType/>
+      </UserInfo>
+    </APEditor>
+    <TPInstallLocation xmlns="4873beb7-5857-4685-be1f-d57550cc96cc" xsi:nil="true"/>
+    <OOCacheId xmlns="4873beb7-5857-4685-be1f-d57550cc96cc" xsi:nil="true"/>
+    <IsDeleted xmlns="4873beb7-5857-4685-be1f-d57550cc96cc">false</IsDeleted>
+    <PublishTargets xmlns="4873beb7-5857-4685-be1f-d57550cc96cc">OfficeOnlineVNext</PublishTargets>
+    <ApprovalLog xmlns="4873beb7-5857-4685-be1f-d57550cc96cc" xsi:nil="true"/>
+    <BugNumber xmlns="4873beb7-5857-4685-be1f-d57550cc96cc" xsi:nil="true"/>
+    <CrawlForDependencies xmlns="4873beb7-5857-4685-be1f-d57550cc96cc">false</CrawlForDependencies>
+    <InternalTagsTaxHTField0 xmlns="4873beb7-5857-4685-be1f-d57550cc96cc">
+      <Terms xmlns="http://schemas.microsoft.com/office/infopath/2007/PartnerControls"/>
+    </InternalTagsTaxHTField0>
+    <LastHandOff xmlns="4873beb7-5857-4685-be1f-d57550cc96cc" xsi:nil="true"/>
+    <Milestone xmlns="4873beb7-5857-4685-be1f-d57550cc96cc" xsi:nil="true"/>
+    <OriginalRelease xmlns="4873beb7-5857-4685-be1f-d57550cc96cc">15</OriginalRelease>
+    <RecommendationsModifier xmlns="4873beb7-5857-4685-be1f-d57550cc96cc" xsi:nil="true"/>
+    <ScenarioTagsTaxHTField0 xmlns="4873beb7-5857-4685-be1f-d57550cc96cc">
+      <Terms xmlns="http://schemas.microsoft.com/office/infopath/2007/PartnerControls"/>
+    </ScenarioTagsTaxHTField0>
+    <UANotes xmlns="4873beb7-5857-4685-be1f-d57550cc96cc" xsi:nil="true"/>
+  </documentManagement>
+</p:properties>
+</file>
+
+<file path=customXml/item2.xml><?xml version="1.0" encoding="utf-8"?>
+<?mso-contentType ?>
+<FormTemplates xmlns="http://schemas.microsoft.com/sharepoint/v3/contenttype/forms">
+  <Display>DocumentLibraryForm</Display>
+  <Edit>AssetEditForm</Edit>
+  <New>DocumentLibraryForm</New>
+</FormTemplates>
+</file>
+
+<file path=customXml/item3.xml><?xml version="1.0" encoding="utf-8"?>
 <ct:contentTypeSchema xmlns:ct="http://schemas.microsoft.com/office/2006/metadata/contentType" xmlns:ma="http://schemas.microsoft.com/office/2006/metadata/properties/metaAttributes" ct:_="" ma:_="" ma:contentTypeName="TemplateFile" ma:contentTypeID="0x0101006EDDDB5EE6D98C44930B742096920B300400F5B6D36B3EF94B4E9A635CDF2A18F5B8" ma:contentTypeVersion="72" ma:contentTypeDescription="Create a new document." ma:contentTypeScope="" ma:versionID="a23e56308344d904b51738559c3d67c9">
   <xsd:schema xmlns:xsd="http://www.w3.org/2001/XMLSchema" xmlns:xs="http://www.w3.org/2001/XMLSchema" xmlns:p="http://schemas.microsoft.com/office/2006/metadata/properties" xmlns:ns2="4873beb7-5857-4685-be1f-d57550cc96cc" targetNamespace="http://schemas.microsoft.com/office/2006/metadata/properties" ma:root="true" ma:fieldsID="cd0908cc4600e77bf5da051303e00c8d" ns2:_="">
     <xsd:import namespace="4873beb7-5857-4685-be1f-d57550cc96cc"/>
@@ -8573,142 +8714,31 @@
 </ct:contentTypeSchema>
 </file>
 
-<file path=customXml/item2.xml><?xml version="1.0" encoding="utf-8"?>
-<?mso-contentType ?>
-<FormTemplates xmlns="http://schemas.microsoft.com/sharepoint/v3/contenttype/forms">
-  <Display>DocumentLibraryForm</Display>
-  <Edit>AssetEditForm</Edit>
-  <New>DocumentLibraryForm</New>
-</FormTemplates>
+<file path=customXml/itemProps1.xml><?xml version="1.0" encoding="utf-8"?>
+<ds:datastoreItem xmlns:ds="http://schemas.openxmlformats.org/officeDocument/2006/customXml" ds:itemID="{8CDDBB83-77C1-4099-A0AA-289882E745E2}">
+  <ds:schemaRefs>
+    <ds:schemaRef ds:uri="http://purl.org/dc/elements/1.1/"/>
+    <ds:schemaRef ds:uri="http://schemas.microsoft.com/office/2006/metadata/properties"/>
+    <ds:schemaRef ds:uri="4873beb7-5857-4685-be1f-d57550cc96cc"/>
+    <ds:schemaRef ds:uri="http://schemas.openxmlformats.org/package/2006/metadata/core-properties"/>
+    <ds:schemaRef ds:uri="http://purl.org/dc/terms/"/>
+    <ds:schemaRef ds:uri="http://schemas.microsoft.com/office/2006/documentManagement/types"/>
+    <ds:schemaRef ds:uri="http://schemas.microsoft.com/office/infopath/2007/PartnerControls"/>
+    <ds:schemaRef ds:uri="http://www.w3.org/XML/1998/namespace"/>
+    <ds:schemaRef ds:uri="http://purl.org/dc/dcmitype/"/>
+  </ds:schemaRefs>
+</ds:datastoreItem>
 </file>
 
-<file path=customXml/item3.xml><?xml version="1.0" encoding="utf-8"?>
-<p:properties xmlns:p="http://schemas.microsoft.com/office/2006/metadata/properties" xmlns:xsi="http://www.w3.org/2001/XMLSchema-instance" xmlns:pc="http://schemas.microsoft.com/office/infopath/2007/PartnerControls">
-  <documentManagement>
-    <APDescription xmlns="4873beb7-5857-4685-be1f-d57550cc96cc" xsi:nil="true"/>
-    <AssetExpire xmlns="4873beb7-5857-4685-be1f-d57550cc96cc">2029-01-01T08:00:00+00:00</AssetExpire>
-    <CampaignTagsTaxHTField0 xmlns="4873beb7-5857-4685-be1f-d57550cc96cc">
-      <Terms xmlns="http://schemas.microsoft.com/office/infopath/2007/PartnerControls"/>
-    </CampaignTagsTaxHTField0>
-    <IntlLangReviewDate xmlns="4873beb7-5857-4685-be1f-d57550cc96cc" xsi:nil="true"/>
-    <TPFriendlyName xmlns="4873beb7-5857-4685-be1f-d57550cc96cc" xsi:nil="true"/>
-    <IntlLangReview xmlns="4873beb7-5857-4685-be1f-d57550cc96cc">false</IntlLangReview>
-    <LocLastLocAttemptVersionLookup xmlns="4873beb7-5857-4685-be1f-d57550cc96cc">855024</LocLastLocAttemptVersionLookup>
-    <PolicheckWords xmlns="4873beb7-5857-4685-be1f-d57550cc96cc" xsi:nil="true"/>
-    <SubmitterId xmlns="4873beb7-5857-4685-be1f-d57550cc96cc" xsi:nil="true"/>
-    <AcquiredFrom xmlns="4873beb7-5857-4685-be1f-d57550cc96cc">Internal MS</AcquiredFrom>
-    <EditorialStatus xmlns="4873beb7-5857-4685-be1f-d57550cc96cc">Complete</EditorialStatus>
-    <Markets xmlns="4873beb7-5857-4685-be1f-d57550cc96cc"/>
-    <OriginAsset xmlns="4873beb7-5857-4685-be1f-d57550cc96cc" xsi:nil="true"/>
-    <AssetStart xmlns="4873beb7-5857-4685-be1f-d57550cc96cc">2012-08-31T08:50:00+00:00</AssetStart>
-    <FriendlyTitle xmlns="4873beb7-5857-4685-be1f-d57550cc96cc" xsi:nil="true"/>
-    <MarketSpecific xmlns="4873beb7-5857-4685-be1f-d57550cc96cc">false</MarketSpecific>
-    <TPNamespace xmlns="4873beb7-5857-4685-be1f-d57550cc96cc" xsi:nil="true"/>
-    <PublishStatusLookup xmlns="4873beb7-5857-4685-be1f-d57550cc96cc">
-      <Value>1616423</Value>
-    </PublishStatusLookup>
-    <APAuthor xmlns="4873beb7-5857-4685-be1f-d57550cc96cc">
-      <UserInfo>
-        <DisplayName>REDMOND\kristaa</DisplayName>
-        <AccountId>136</AccountId>
-        <AccountType/>
-      </UserInfo>
-    </APAuthor>
-    <TPCommandLine xmlns="4873beb7-5857-4685-be1f-d57550cc96cc" xsi:nil="true"/>
-    <IntlLangReviewer xmlns="4873beb7-5857-4685-be1f-d57550cc96cc" xsi:nil="true"/>
-    <OpenTemplate xmlns="4873beb7-5857-4685-be1f-d57550cc96cc">true</OpenTemplate>
-    <CSXSubmissionDate xmlns="4873beb7-5857-4685-be1f-d57550cc96cc" xsi:nil="true"/>
-    <TaxCatchAll xmlns="4873beb7-5857-4685-be1f-d57550cc96cc"/>
-    <Manager xmlns="4873beb7-5857-4685-be1f-d57550cc96cc" xsi:nil="true"/>
-    <NumericId xmlns="4873beb7-5857-4685-be1f-d57550cc96cc" xsi:nil="true"/>
-    <ParentAssetId xmlns="4873beb7-5857-4685-be1f-d57550cc96cc" xsi:nil="true"/>
-    <OriginalSourceMarket xmlns="4873beb7-5857-4685-be1f-d57550cc96cc" xsi:nil="true"/>
-    <ApprovalStatus xmlns="4873beb7-5857-4685-be1f-d57550cc96cc">InProgress</ApprovalStatus>
-    <TPComponent xmlns="4873beb7-5857-4685-be1f-d57550cc96cc" xsi:nil="true"/>
-    <EditorialTags xmlns="4873beb7-5857-4685-be1f-d57550cc96cc" xsi:nil="true"/>
-    <TPExecutable xmlns="4873beb7-5857-4685-be1f-d57550cc96cc" xsi:nil="true"/>
-    <TPLaunchHelpLink xmlns="4873beb7-5857-4685-be1f-d57550cc96cc" xsi:nil="true"/>
-    <LocComments xmlns="4873beb7-5857-4685-be1f-d57550cc96cc" xsi:nil="true"/>
-    <LocRecommendedHandoff xmlns="4873beb7-5857-4685-be1f-d57550cc96cc" xsi:nil="true"/>
-    <SourceTitle xmlns="4873beb7-5857-4685-be1f-d57550cc96cc" xsi:nil="true"/>
-    <CSXUpdate xmlns="4873beb7-5857-4685-be1f-d57550cc96cc">false</CSXUpdate>
-    <IntlLocPriority xmlns="4873beb7-5857-4685-be1f-d57550cc96cc" xsi:nil="true"/>
-    <UAProjectedTotalWords xmlns="4873beb7-5857-4685-be1f-d57550cc96cc" xsi:nil="true"/>
-    <AssetType xmlns="4873beb7-5857-4685-be1f-d57550cc96cc">TP</AssetType>
-    <MachineTranslated xmlns="4873beb7-5857-4685-be1f-d57550cc96cc">false</MachineTranslated>
-    <OutputCachingOn xmlns="4873beb7-5857-4685-be1f-d57550cc96cc">false</OutputCachingOn>
-    <TemplateStatus xmlns="4873beb7-5857-4685-be1f-d57550cc96cc">Complete</TemplateStatus>
-    <IsSearchable xmlns="4873beb7-5857-4685-be1f-d57550cc96cc">true</IsSearchable>
-    <ContentItem xmlns="4873beb7-5857-4685-be1f-d57550cc96cc" xsi:nil="true"/>
-    <HandoffToMSDN xmlns="4873beb7-5857-4685-be1f-d57550cc96cc" xsi:nil="true"/>
-    <ShowIn xmlns="4873beb7-5857-4685-be1f-d57550cc96cc">Show everywhere</ShowIn>
-    <ThumbnailAssetId xmlns="4873beb7-5857-4685-be1f-d57550cc96cc" xsi:nil="true"/>
-    <UALocComments xmlns="4873beb7-5857-4685-be1f-d57550cc96cc" xsi:nil="true"/>
-    <UALocRecommendation xmlns="4873beb7-5857-4685-be1f-d57550cc96cc">Localize</UALocRecommendation>
-    <LastModifiedDateTime xmlns="4873beb7-5857-4685-be1f-d57550cc96cc" xsi:nil="true"/>
-    <LegacyData xmlns="4873beb7-5857-4685-be1f-d57550cc96cc" xsi:nil="true"/>
-    <LocManualTestRequired xmlns="4873beb7-5857-4685-be1f-d57550cc96cc">false</LocManualTestRequired>
-    <LocMarketGroupTiers2 xmlns="4873beb7-5857-4685-be1f-d57550cc96cc" xsi:nil="true"/>
-    <ClipArtFilename xmlns="4873beb7-5857-4685-be1f-d57550cc96cc" xsi:nil="true"/>
-    <TPApplication xmlns="4873beb7-5857-4685-be1f-d57550cc96cc" xsi:nil="true"/>
-    <CSXHash xmlns="4873beb7-5857-4685-be1f-d57550cc96cc" xsi:nil="true"/>
-    <DirectSourceMarket xmlns="4873beb7-5857-4685-be1f-d57550cc96cc" xsi:nil="true"/>
-    <PrimaryImageGen xmlns="4873beb7-5857-4685-be1f-d57550cc96cc">true</PrimaryImageGen>
-    <PlannedPubDate xmlns="4873beb7-5857-4685-be1f-d57550cc96cc" xsi:nil="true"/>
-    <CSXSubmissionMarket xmlns="4873beb7-5857-4685-be1f-d57550cc96cc" xsi:nil="true"/>
-    <Downloads xmlns="4873beb7-5857-4685-be1f-d57550cc96cc">0</Downloads>
-    <ArtSampleDocs xmlns="4873beb7-5857-4685-be1f-d57550cc96cc" xsi:nil="true"/>
-    <TrustLevel xmlns="4873beb7-5857-4685-be1f-d57550cc96cc">1 Microsoft Managed Content</TrustLevel>
-    <BlockPublish xmlns="4873beb7-5857-4685-be1f-d57550cc96cc">false</BlockPublish>
-    <TPLaunchHelpLinkType xmlns="4873beb7-5857-4685-be1f-d57550cc96cc">Template</TPLaunchHelpLinkType>
-    <LocalizationTagsTaxHTField0 xmlns="4873beb7-5857-4685-be1f-d57550cc96cc">
-      <Terms xmlns="http://schemas.microsoft.com/office/infopath/2007/PartnerControls"/>
-    </LocalizationTagsTaxHTField0>
-    <BusinessGroup xmlns="4873beb7-5857-4685-be1f-d57550cc96cc" xsi:nil="true"/>
-    <Providers xmlns="4873beb7-5857-4685-be1f-d57550cc96cc" xsi:nil="true"/>
-    <TemplateTemplateType xmlns="4873beb7-5857-4685-be1f-d57550cc96cc">PowerPoint Presentation Template</TemplateTemplateType>
-    <TimesCloned xmlns="4873beb7-5857-4685-be1f-d57550cc96cc" xsi:nil="true"/>
-    <TPAppVersion xmlns="4873beb7-5857-4685-be1f-d57550cc96cc" xsi:nil="true"/>
-    <VoteCount xmlns="4873beb7-5857-4685-be1f-d57550cc96cc" xsi:nil="true"/>
-    <AverageRating xmlns="4873beb7-5857-4685-be1f-d57550cc96cc" xsi:nil="true"/>
-    <FeatureTagsTaxHTField0 xmlns="4873beb7-5857-4685-be1f-d57550cc96cc">
-      <Terms xmlns="http://schemas.microsoft.com/office/infopath/2007/PartnerControls"/>
-    </FeatureTagsTaxHTField0>
-    <Provider xmlns="4873beb7-5857-4685-be1f-d57550cc96cc" xsi:nil="true"/>
-    <UACurrentWords xmlns="4873beb7-5857-4685-be1f-d57550cc96cc" xsi:nil="true"/>
-    <AssetId xmlns="4873beb7-5857-4685-be1f-d57550cc96cc">TP103431361</AssetId>
-    <TPClientViewer xmlns="4873beb7-5857-4685-be1f-d57550cc96cc" xsi:nil="true"/>
-    <DSATActionTaken xmlns="4873beb7-5857-4685-be1f-d57550cc96cc" xsi:nil="true"/>
-    <APEditor xmlns="4873beb7-5857-4685-be1f-d57550cc96cc">
-      <UserInfo>
-        <DisplayName/>
-        <AccountId xsi:nil="true"/>
-        <AccountType/>
-      </UserInfo>
-    </APEditor>
-    <TPInstallLocation xmlns="4873beb7-5857-4685-be1f-d57550cc96cc" xsi:nil="true"/>
-    <OOCacheId xmlns="4873beb7-5857-4685-be1f-d57550cc96cc" xsi:nil="true"/>
-    <IsDeleted xmlns="4873beb7-5857-4685-be1f-d57550cc96cc">false</IsDeleted>
-    <PublishTargets xmlns="4873beb7-5857-4685-be1f-d57550cc96cc">OfficeOnlineVNext</PublishTargets>
-    <ApprovalLog xmlns="4873beb7-5857-4685-be1f-d57550cc96cc" xsi:nil="true"/>
-    <BugNumber xmlns="4873beb7-5857-4685-be1f-d57550cc96cc" xsi:nil="true"/>
-    <CrawlForDependencies xmlns="4873beb7-5857-4685-be1f-d57550cc96cc">false</CrawlForDependencies>
-    <InternalTagsTaxHTField0 xmlns="4873beb7-5857-4685-be1f-d57550cc96cc">
-      <Terms xmlns="http://schemas.microsoft.com/office/infopath/2007/PartnerControls"/>
-    </InternalTagsTaxHTField0>
-    <LastHandOff xmlns="4873beb7-5857-4685-be1f-d57550cc96cc" xsi:nil="true"/>
-    <Milestone xmlns="4873beb7-5857-4685-be1f-d57550cc96cc" xsi:nil="true"/>
-    <OriginalRelease xmlns="4873beb7-5857-4685-be1f-d57550cc96cc">15</OriginalRelease>
-    <RecommendationsModifier xmlns="4873beb7-5857-4685-be1f-d57550cc96cc" xsi:nil="true"/>
-    <ScenarioTagsTaxHTField0 xmlns="4873beb7-5857-4685-be1f-d57550cc96cc">
-      <Terms xmlns="http://schemas.microsoft.com/office/infopath/2007/PartnerControls"/>
-    </ScenarioTagsTaxHTField0>
-    <UANotes xmlns="4873beb7-5857-4685-be1f-d57550cc96cc" xsi:nil="true"/>
-  </documentManagement>
-</p:properties>
+<file path=customXml/itemProps2.xml><?xml version="1.0" encoding="utf-8"?>
+<ds:datastoreItem xmlns:ds="http://schemas.openxmlformats.org/officeDocument/2006/customXml" ds:itemID="{561E720F-F05D-4536-9C34-0CFCED65D3B7}">
+  <ds:schemaRefs>
+    <ds:schemaRef ds:uri="http://schemas.microsoft.com/sharepoint/v3/contenttype/forms"/>
+  </ds:schemaRefs>
+</ds:datastoreItem>
 </file>
 
-<file path=customXml/itemProps1.xml><?xml version="1.0" encoding="utf-8"?>
+<file path=customXml/itemProps3.xml><?xml version="1.0" encoding="utf-8"?>
 <ds:datastoreItem xmlns:ds="http://schemas.openxmlformats.org/officeDocument/2006/customXml" ds:itemID="{28C8B9CA-0273-4370-889A-FC05DA5C2FA5}">
   <ds:schemaRefs>
     <ds:schemaRef ds:uri="http://schemas.microsoft.com/office/2006/metadata/contentType"/>
@@ -8724,28 +8754,4 @@
     <ds:schemaRef ds:uri="http://schemas.microsoft.com/internal/obd"/>
   </ds:schemaRefs>
 </ds:datastoreItem>
-</file>
-
-<file path=customXml/itemProps2.xml><?xml version="1.0" encoding="utf-8"?>
-<ds:datastoreItem xmlns:ds="http://schemas.openxmlformats.org/officeDocument/2006/customXml" ds:itemID="{561E720F-F05D-4536-9C34-0CFCED65D3B7}">
-  <ds:schemaRefs>
-    <ds:schemaRef ds:uri="http://schemas.microsoft.com/sharepoint/v3/contenttype/forms"/>
-  </ds:schemaRefs>
-</ds:datastoreItem>
-</file>
-
-<file path=customXml/itemProps3.xml><?xml version="1.0" encoding="utf-8"?>
-<ds:datastoreItem xmlns:ds="http://schemas.openxmlformats.org/officeDocument/2006/customXml" ds:itemID="{8CDDBB83-77C1-4099-A0AA-289882E745E2}">
-  <ds:schemaRefs>
-    <ds:schemaRef ds:uri="http://purl.org/dc/elements/1.1/"/>
-    <ds:schemaRef ds:uri="http://schemas.microsoft.com/office/2006/metadata/properties"/>
-    <ds:schemaRef ds:uri="4873beb7-5857-4685-be1f-d57550cc96cc"/>
-    <ds:schemaRef ds:uri="http://schemas.openxmlformats.org/package/2006/metadata/core-properties"/>
-    <ds:schemaRef ds:uri="http://purl.org/dc/terms/"/>
-    <ds:schemaRef ds:uri="http://schemas.microsoft.com/office/2006/documentManagement/types"/>
-    <ds:schemaRef ds:uri="http://schemas.microsoft.com/office/infopath/2007/PartnerControls"/>
-    <ds:schemaRef ds:uri="http://www.w3.org/XML/1998/namespace"/>
-    <ds:schemaRef ds:uri="http://purl.org/dc/dcmitype/"/>
-  </ds:schemaRefs>
-</ds:datastoreItem>
 </file>
</xml_diff>